<commit_message>
Chris pres draft 3
</commit_message>
<xml_diff>
--- a/chris pres.pptx
+++ b/chris pres.pptx
@@ -111,6 +111,14 @@
       </a:defRPr>
     </a:lvl9pPr>
   </p:defaultTextStyle>
+  <p:extLst>
+    <p:ext uri="{EFAFB233-063F-42B5-8137-9DF3F51BA10A}">
+      <p15:sldGuideLst xmlns:p15="http://schemas.microsoft.com/office/powerpoint/2012/main"/>
+    </p:ext>
+    <p:ext uri="{2D200454-40CA-4A62-9FC3-DE9A4176ACB9}">
+      <p15:notesGuideLst xmlns:p15="http://schemas.microsoft.com/office/powerpoint/2012/main"/>
+    </p:ext>
+  </p:extLst>
 </p:presentation>
 </file>
 
@@ -196,7 +204,7 @@
           <a:p>
             <a:fld id="{0E41B2FF-49A4-4AB6-AFE8-12A8E45889FF}" type="datetimeFigureOut">
               <a:rPr lang="en-GB" smtClean="0"/>
-              <a:t>16/02/2018</a:t>
+              <a:t>19/02/2018</a:t>
             </a:fld>
             <a:endParaRPr lang="en-GB"/>
           </a:p>
@@ -763,7 +771,7 @@
           <a:p>
             <a:fld id="{84D7400E-9ED8-4080-9868-99E84C0707DB}" type="datetimeFigureOut">
               <a:rPr lang="en-GB" smtClean="0"/>
-              <a:t>16/02/2018</a:t>
+              <a:t>19/02/2018</a:t>
             </a:fld>
             <a:endParaRPr lang="en-GB" dirty="0"/>
           </a:p>
@@ -933,7 +941,7 @@
           <a:p>
             <a:fld id="{84D7400E-9ED8-4080-9868-99E84C0707DB}" type="datetimeFigureOut">
               <a:rPr lang="en-GB" smtClean="0"/>
-              <a:t>16/02/2018</a:t>
+              <a:t>19/02/2018</a:t>
             </a:fld>
             <a:endParaRPr lang="en-GB" dirty="0"/>
           </a:p>
@@ -1113,7 +1121,7 @@
           <a:p>
             <a:fld id="{84D7400E-9ED8-4080-9868-99E84C0707DB}" type="datetimeFigureOut">
               <a:rPr lang="en-GB" smtClean="0"/>
-              <a:t>16/02/2018</a:t>
+              <a:t>19/02/2018</a:t>
             </a:fld>
             <a:endParaRPr lang="en-GB" dirty="0"/>
           </a:p>
@@ -1283,7 +1291,7 @@
           <a:p>
             <a:fld id="{84D7400E-9ED8-4080-9868-99E84C0707DB}" type="datetimeFigureOut">
               <a:rPr lang="en-GB" smtClean="0"/>
-              <a:t>16/02/2018</a:t>
+              <a:t>19/02/2018</a:t>
             </a:fld>
             <a:endParaRPr lang="en-GB" dirty="0"/>
           </a:p>
@@ -1529,7 +1537,7 @@
           <a:p>
             <a:fld id="{84D7400E-9ED8-4080-9868-99E84C0707DB}" type="datetimeFigureOut">
               <a:rPr lang="en-GB" smtClean="0"/>
-              <a:t>16/02/2018</a:t>
+              <a:t>19/02/2018</a:t>
             </a:fld>
             <a:endParaRPr lang="en-GB" dirty="0"/>
           </a:p>
@@ -1761,7 +1769,7 @@
           <a:p>
             <a:fld id="{84D7400E-9ED8-4080-9868-99E84C0707DB}" type="datetimeFigureOut">
               <a:rPr lang="en-GB" smtClean="0"/>
-              <a:t>16/02/2018</a:t>
+              <a:t>19/02/2018</a:t>
             </a:fld>
             <a:endParaRPr lang="en-GB" dirty="0"/>
           </a:p>
@@ -2128,7 +2136,7 @@
           <a:p>
             <a:fld id="{84D7400E-9ED8-4080-9868-99E84C0707DB}" type="datetimeFigureOut">
               <a:rPr lang="en-GB" smtClean="0"/>
-              <a:t>16/02/2018</a:t>
+              <a:t>19/02/2018</a:t>
             </a:fld>
             <a:endParaRPr lang="en-GB" dirty="0"/>
           </a:p>
@@ -2246,7 +2254,7 @@
           <a:p>
             <a:fld id="{84D7400E-9ED8-4080-9868-99E84C0707DB}" type="datetimeFigureOut">
               <a:rPr lang="en-GB" smtClean="0"/>
-              <a:t>16/02/2018</a:t>
+              <a:t>19/02/2018</a:t>
             </a:fld>
             <a:endParaRPr lang="en-GB" dirty="0"/>
           </a:p>
@@ -2341,7 +2349,7 @@
           <a:p>
             <a:fld id="{84D7400E-9ED8-4080-9868-99E84C0707DB}" type="datetimeFigureOut">
               <a:rPr lang="en-GB" smtClean="0"/>
-              <a:t>16/02/2018</a:t>
+              <a:t>19/02/2018</a:t>
             </a:fld>
             <a:endParaRPr lang="en-GB" dirty="0"/>
           </a:p>
@@ -2618,7 +2626,7 @@
           <a:p>
             <a:fld id="{84D7400E-9ED8-4080-9868-99E84C0707DB}" type="datetimeFigureOut">
               <a:rPr lang="en-GB" smtClean="0"/>
-              <a:t>16/02/2018</a:t>
+              <a:t>19/02/2018</a:t>
             </a:fld>
             <a:endParaRPr lang="en-GB" dirty="0"/>
           </a:p>
@@ -2871,7 +2879,7 @@
           <a:p>
             <a:fld id="{84D7400E-9ED8-4080-9868-99E84C0707DB}" type="datetimeFigureOut">
               <a:rPr lang="en-GB" smtClean="0"/>
-              <a:t>16/02/2018</a:t>
+              <a:t>19/02/2018</a:t>
             </a:fld>
             <a:endParaRPr lang="en-GB" dirty="0"/>
           </a:p>
@@ -3084,7 +3092,7 @@
           <a:p>
             <a:fld id="{84D7400E-9ED8-4080-9868-99E84C0707DB}" type="datetimeFigureOut">
               <a:rPr lang="en-GB" smtClean="0"/>
-              <a:t>16/02/2018</a:t>
+              <a:t>19/02/2018</a:t>
             </a:fld>
             <a:endParaRPr lang="en-GB" dirty="0"/>
           </a:p>
@@ -4098,7 +4106,7 @@
         </p:nvSpPr>
         <p:spPr>
           <a:xfrm>
-            <a:off x="4009291" y="3115434"/>
+            <a:off x="3094891" y="3115434"/>
             <a:ext cx="1922585" cy="369332"/>
           </a:xfrm>
           <a:prstGeom prst="rect">
@@ -4143,7 +4151,7 @@
         </p:nvSpPr>
         <p:spPr>
           <a:xfrm>
-            <a:off x="7291754" y="3115434"/>
+            <a:off x="6282104" y="3115434"/>
             <a:ext cx="2508737" cy="369332"/>
           </a:xfrm>
           <a:prstGeom prst="rect">
@@ -4206,7 +4214,7 @@
         </p:nvSpPr>
         <p:spPr>
           <a:xfrm>
-            <a:off x="1043352" y="3115434"/>
+            <a:off x="128952" y="3115434"/>
             <a:ext cx="1922585" cy="369332"/>
           </a:xfrm>
           <a:prstGeom prst="rect">
@@ -4251,7 +4259,7 @@
         </p:nvSpPr>
         <p:spPr>
           <a:xfrm>
-            <a:off x="6002215" y="4488594"/>
+            <a:off x="4992565" y="4488594"/>
             <a:ext cx="1922585" cy="646331"/>
           </a:xfrm>
           <a:prstGeom prst="rect">
@@ -4296,7 +4304,7 @@
         </p:nvSpPr>
         <p:spPr>
           <a:xfrm>
-            <a:off x="8452337" y="4488594"/>
+            <a:off x="7442687" y="4488594"/>
             <a:ext cx="2309448" cy="369332"/>
           </a:xfrm>
           <a:prstGeom prst="rect">
@@ -4385,8 +4393,8 @@
         </p:nvCxnSpPr>
         <p:spPr>
           <a:xfrm>
-            <a:off x="1754909" y="2761673"/>
-            <a:ext cx="6871855" cy="36945"/>
+            <a:off x="869084" y="2761672"/>
+            <a:ext cx="10132291" cy="36946"/>
           </a:xfrm>
           <a:prstGeom prst="line">
             <a:avLst/>
@@ -4420,7 +4428,7 @@
         </p:nvCxnSpPr>
         <p:spPr>
           <a:xfrm>
-            <a:off x="1754909" y="2761673"/>
+            <a:off x="869084" y="2761673"/>
             <a:ext cx="0" cy="353761"/>
           </a:xfrm>
           <a:prstGeom prst="line">
@@ -4455,7 +4463,7 @@
         </p:nvCxnSpPr>
         <p:spPr>
           <a:xfrm>
-            <a:off x="4858327" y="2761672"/>
+            <a:off x="3972502" y="2761672"/>
             <a:ext cx="0" cy="353761"/>
           </a:xfrm>
           <a:prstGeom prst="line">
@@ -4490,7 +4498,7 @@
         </p:nvCxnSpPr>
         <p:spPr>
           <a:xfrm>
-            <a:off x="8638771" y="2761672"/>
+            <a:off x="7629121" y="2761672"/>
             <a:ext cx="0" cy="353761"/>
           </a:xfrm>
           <a:prstGeom prst="line">
@@ -4525,7 +4533,7 @@
         </p:nvCxnSpPr>
         <p:spPr>
           <a:xfrm>
-            <a:off x="7455877" y="3484766"/>
+            <a:off x="6446227" y="3484766"/>
             <a:ext cx="0" cy="1003828"/>
           </a:xfrm>
           <a:prstGeom prst="line">
@@ -4555,14 +4563,12 @@
       <p:cxnSp>
         <p:nvCxnSpPr>
           <p:cNvPr id="33" name="Straight Connector 32"/>
-          <p:cNvCxnSpPr>
-            <a:endCxn id="11" idx="0"/>
-          </p:cNvCxnSpPr>
+          <p:cNvCxnSpPr/>
           <p:nvPr/>
         </p:nvCxnSpPr>
         <p:spPr>
           <a:xfrm>
-            <a:off x="9601200" y="3484766"/>
+            <a:off x="8591550" y="3484766"/>
             <a:ext cx="5861" cy="1003828"/>
           </a:xfrm>
           <a:prstGeom prst="line">
@@ -4623,6 +4629,166 @@
           </a:p>
           <a:p>
             <a:endParaRPr lang="en-GB" sz="3600" b="1" dirty="0" smtClean="0">
+              <a:solidFill>
+                <a:schemeClr val="bg1"/>
+              </a:solidFill>
+              <a:latin typeface="Lucida Console" panose="020B0609040504020204" pitchFamily="49" charset="0"/>
+            </a:endParaRPr>
+          </a:p>
+        </p:txBody>
+      </p:sp>
+      <p:cxnSp>
+        <p:nvCxnSpPr>
+          <p:cNvPr id="19" name="Straight Connector 18"/>
+          <p:cNvCxnSpPr/>
+          <p:nvPr/>
+        </p:nvCxnSpPr>
+        <p:spPr>
+          <a:xfrm>
+            <a:off x="11001375" y="2798618"/>
+            <a:ext cx="0" cy="353761"/>
+          </a:xfrm>
+          <a:prstGeom prst="line">
+            <a:avLst/>
+          </a:prstGeom>
+          <a:ln w="38100">
+            <a:solidFill>
+              <a:schemeClr val="bg1"/>
+            </a:solidFill>
+          </a:ln>
+        </p:spPr>
+        <p:style>
+          <a:lnRef idx="1">
+            <a:schemeClr val="accent1"/>
+          </a:lnRef>
+          <a:fillRef idx="0">
+            <a:schemeClr val="accent1"/>
+          </a:fillRef>
+          <a:effectRef idx="0">
+            <a:schemeClr val="accent1"/>
+          </a:effectRef>
+          <a:fontRef idx="minor">
+            <a:schemeClr val="tx1"/>
+          </a:fontRef>
+        </p:style>
+      </p:cxnSp>
+      <p:sp>
+        <p:nvSpPr>
+          <p:cNvPr id="21" name="TextBox 20"/>
+          <p:cNvSpPr txBox="1"/>
+          <p:nvPr/>
+        </p:nvSpPr>
+        <p:spPr>
+          <a:xfrm>
+            <a:off x="10408625" y="3161508"/>
+            <a:ext cx="1055075" cy="369332"/>
+          </a:xfrm>
+          <a:prstGeom prst="rect">
+            <a:avLst/>
+          </a:prstGeom>
+          <a:noFill/>
+          <a:ln>
+            <a:solidFill>
+              <a:schemeClr val="bg1"/>
+            </a:solidFill>
+          </a:ln>
+        </p:spPr>
+        <p:txBody>
+          <a:bodyPr wrap="square" rtlCol="0">
+            <a:spAutoFit/>
+          </a:bodyPr>
+          <a:lstStyle/>
+          <a:p>
+            <a:r>
+              <a:rPr lang="en-GB" dirty="0" smtClean="0">
+                <a:solidFill>
+                  <a:schemeClr val="bg1"/>
+                </a:solidFill>
+                <a:latin typeface="Lucida Console" panose="020B0609040504020204" pitchFamily="49" charset="0"/>
+              </a:rPr>
+              <a:t>Login</a:t>
+            </a:r>
+            <a:endParaRPr lang="en-GB" dirty="0">
+              <a:solidFill>
+                <a:schemeClr val="bg1"/>
+              </a:solidFill>
+              <a:latin typeface="Lucida Console" panose="020B0609040504020204" pitchFamily="49" charset="0"/>
+            </a:endParaRPr>
+          </a:p>
+        </p:txBody>
+      </p:sp>
+      <p:cxnSp>
+        <p:nvCxnSpPr>
+          <p:cNvPr id="22" name="Straight Connector 21"/>
+          <p:cNvCxnSpPr/>
+          <p:nvPr/>
+        </p:nvCxnSpPr>
+        <p:spPr>
+          <a:xfrm>
+            <a:off x="11001375" y="3530840"/>
+            <a:ext cx="0" cy="353761"/>
+          </a:xfrm>
+          <a:prstGeom prst="line">
+            <a:avLst/>
+          </a:prstGeom>
+          <a:ln w="38100">
+            <a:solidFill>
+              <a:schemeClr val="bg1"/>
+            </a:solidFill>
+          </a:ln>
+        </p:spPr>
+        <p:style>
+          <a:lnRef idx="1">
+            <a:schemeClr val="accent1"/>
+          </a:lnRef>
+          <a:fillRef idx="0">
+            <a:schemeClr val="accent1"/>
+          </a:fillRef>
+          <a:effectRef idx="0">
+            <a:schemeClr val="accent1"/>
+          </a:effectRef>
+          <a:fontRef idx="minor">
+            <a:schemeClr val="tx1"/>
+          </a:fontRef>
+        </p:style>
+      </p:cxnSp>
+      <p:sp>
+        <p:nvSpPr>
+          <p:cNvPr id="24" name="TextBox 23"/>
+          <p:cNvSpPr txBox="1"/>
+          <p:nvPr/>
+        </p:nvSpPr>
+        <p:spPr>
+          <a:xfrm>
+            <a:off x="10408625" y="3884601"/>
+            <a:ext cx="1488832" cy="369332"/>
+          </a:xfrm>
+          <a:prstGeom prst="rect">
+            <a:avLst/>
+          </a:prstGeom>
+          <a:noFill/>
+          <a:ln>
+            <a:solidFill>
+              <a:schemeClr val="bg1"/>
+            </a:solidFill>
+          </a:ln>
+        </p:spPr>
+        <p:txBody>
+          <a:bodyPr wrap="square" rtlCol="0">
+            <a:spAutoFit/>
+          </a:bodyPr>
+          <a:lstStyle/>
+          <a:p>
+            <a:r>
+              <a:rPr lang="en-GB" dirty="0" err="1" smtClean="0">
+                <a:solidFill>
+                  <a:schemeClr val="bg1"/>
+                </a:solidFill>
+                <a:latin typeface="Lucida Console" panose="020B0609040504020204" pitchFamily="49" charset="0"/>
+              </a:rPr>
+              <a:t>myAccount</a:t>
+            </a:r>
+            <a:endParaRPr lang="en-GB" dirty="0">
               <a:solidFill>
                 <a:schemeClr val="bg1"/>
               </a:solidFill>

</xml_diff>